<commit_message>
actual ejemplos y ppt
</commit_message>
<xml_diff>
--- a/Clase_06/pipe_biociencias.pptx
+++ b/Clase_06/pipe_biociencias.pptx
@@ -217,7 +217,7 @@
           <a:p>
             <a:fld id="{5959BFF2-16E0-0044-B1D2-F5DC38D5FA92}" type="datetimeFigureOut">
               <a:rPr lang="en-US" smtClean="0"/>
-              <a:t>9/17/22</a:t>
+              <a:t>4/16/23</a:t>
             </a:fld>
             <a:endParaRPr lang="en-US"/>
           </a:p>
@@ -616,7 +616,7 @@
           <a:p>
             <a:fld id="{CB3FE2B0-5423-084F-987F-FCE4468157FD}" type="datetimeFigureOut">
               <a:rPr lang="en-US" smtClean="0"/>
-              <a:t>9/17/22</a:t>
+              <a:t>4/16/23</a:t>
             </a:fld>
             <a:endParaRPr lang="en-US"/>
           </a:p>
@@ -786,7 +786,7 @@
           <a:p>
             <a:fld id="{CB3FE2B0-5423-084F-987F-FCE4468157FD}" type="datetimeFigureOut">
               <a:rPr lang="en-US" smtClean="0"/>
-              <a:t>9/17/22</a:t>
+              <a:t>4/16/23</a:t>
             </a:fld>
             <a:endParaRPr lang="en-US"/>
           </a:p>
@@ -966,7 +966,7 @@
           <a:p>
             <a:fld id="{CB3FE2B0-5423-084F-987F-FCE4468157FD}" type="datetimeFigureOut">
               <a:rPr lang="en-US" smtClean="0"/>
-              <a:t>9/17/22</a:t>
+              <a:t>4/16/23</a:t>
             </a:fld>
             <a:endParaRPr lang="en-US"/>
           </a:p>
@@ -1136,7 +1136,7 @@
           <a:p>
             <a:fld id="{CB3FE2B0-5423-084F-987F-FCE4468157FD}" type="datetimeFigureOut">
               <a:rPr lang="en-US" smtClean="0"/>
-              <a:t>9/17/22</a:t>
+              <a:t>4/16/23</a:t>
             </a:fld>
             <a:endParaRPr lang="en-US"/>
           </a:p>
@@ -1382,7 +1382,7 @@
           <a:p>
             <a:fld id="{CB3FE2B0-5423-084F-987F-FCE4468157FD}" type="datetimeFigureOut">
               <a:rPr lang="en-US" smtClean="0"/>
-              <a:t>9/17/22</a:t>
+              <a:t>4/16/23</a:t>
             </a:fld>
             <a:endParaRPr lang="en-US"/>
           </a:p>
@@ -1614,7 +1614,7 @@
           <a:p>
             <a:fld id="{CB3FE2B0-5423-084F-987F-FCE4468157FD}" type="datetimeFigureOut">
               <a:rPr lang="en-US" smtClean="0"/>
-              <a:t>9/17/22</a:t>
+              <a:t>4/16/23</a:t>
             </a:fld>
             <a:endParaRPr lang="en-US"/>
           </a:p>
@@ -1981,7 +1981,7 @@
           <a:p>
             <a:fld id="{CB3FE2B0-5423-084F-987F-FCE4468157FD}" type="datetimeFigureOut">
               <a:rPr lang="en-US" smtClean="0"/>
-              <a:t>9/17/22</a:t>
+              <a:t>4/16/23</a:t>
             </a:fld>
             <a:endParaRPr lang="en-US"/>
           </a:p>
@@ -2099,7 +2099,7 @@
           <a:p>
             <a:fld id="{CB3FE2B0-5423-084F-987F-FCE4468157FD}" type="datetimeFigureOut">
               <a:rPr lang="en-US" smtClean="0"/>
-              <a:t>9/17/22</a:t>
+              <a:t>4/16/23</a:t>
             </a:fld>
             <a:endParaRPr lang="en-US"/>
           </a:p>
@@ -2194,7 +2194,7 @@
           <a:p>
             <a:fld id="{CB3FE2B0-5423-084F-987F-FCE4468157FD}" type="datetimeFigureOut">
               <a:rPr lang="en-US" smtClean="0"/>
-              <a:t>9/17/22</a:t>
+              <a:t>4/16/23</a:t>
             </a:fld>
             <a:endParaRPr lang="en-US"/>
           </a:p>
@@ -2471,7 +2471,7 @@
           <a:p>
             <a:fld id="{CB3FE2B0-5423-084F-987F-FCE4468157FD}" type="datetimeFigureOut">
               <a:rPr lang="en-US" smtClean="0"/>
-              <a:t>9/17/22</a:t>
+              <a:t>4/16/23</a:t>
             </a:fld>
             <a:endParaRPr lang="en-US"/>
           </a:p>
@@ -2724,7 +2724,7 @@
           <a:p>
             <a:fld id="{CB3FE2B0-5423-084F-987F-FCE4468157FD}" type="datetimeFigureOut">
               <a:rPr lang="en-US" smtClean="0"/>
-              <a:t>9/17/22</a:t>
+              <a:t>4/16/23</a:t>
             </a:fld>
             <a:endParaRPr lang="en-US"/>
           </a:p>
@@ -2937,7 +2937,7 @@
           <a:p>
             <a:fld id="{CB3FE2B0-5423-084F-987F-FCE4468157FD}" type="datetimeFigureOut">
               <a:rPr lang="en-US" smtClean="0"/>
-              <a:t>9/17/22</a:t>
+              <a:t>4/16/23</a:t>
             </a:fld>
             <a:endParaRPr lang="en-US"/>
           </a:p>
@@ -3940,7 +3940,7 @@
           <p:nvPr>
             <p:extLst>
               <p:ext uri="{D42A27DB-BD31-4B8C-83A1-F6EECF244321}">
-                <p14:modId xmlns:p14="http://schemas.microsoft.com/office/powerpoint/2010/main" val="2625557526"/>
+                <p14:modId xmlns:p14="http://schemas.microsoft.com/office/powerpoint/2010/main" val="141859050"/>
               </p:ext>
             </p:extLst>
           </p:nvPr>
@@ -4055,9 +4055,7 @@
                   </a:txBody>
                   <a:tcPr>
                     <a:solidFill>
-                      <a:schemeClr val="accent1">
-                        <a:lumMod val="50000"/>
-                      </a:schemeClr>
+                      <a:schemeClr val="accent2"/>
                     </a:solidFill>
                   </a:tcPr>
                 </a:tc>
@@ -4137,9 +4135,7 @@
                   </a:txBody>
                   <a:tcPr>
                     <a:solidFill>
-                      <a:schemeClr val="accent1">
-                        <a:lumMod val="50000"/>
-                      </a:schemeClr>
+                      <a:schemeClr val="accent2"/>
                     </a:solidFill>
                   </a:tcPr>
                 </a:tc>
@@ -4219,9 +4215,7 @@
                   </a:txBody>
                   <a:tcPr>
                     <a:solidFill>
-                      <a:schemeClr val="accent1">
-                        <a:lumMod val="50000"/>
-                      </a:schemeClr>
+                      <a:schemeClr val="accent2"/>
                     </a:solidFill>
                   </a:tcPr>
                 </a:tc>
@@ -4250,7 +4244,7 @@
           <p:nvPr>
             <p:extLst>
               <p:ext uri="{D42A27DB-BD31-4B8C-83A1-F6EECF244321}">
-                <p14:modId xmlns:p14="http://schemas.microsoft.com/office/powerpoint/2010/main" val="250342247"/>
+                <p14:modId xmlns:p14="http://schemas.microsoft.com/office/powerpoint/2010/main" val="1825537061"/>
               </p:ext>
             </p:extLst>
           </p:nvPr>
@@ -4742,9 +4736,7 @@
                   </a:txBody>
                   <a:tcPr>
                     <a:solidFill>
-                      <a:schemeClr val="accent1">
-                        <a:lumMod val="50000"/>
-                      </a:schemeClr>
+                      <a:schemeClr val="accent2"/>
                     </a:solidFill>
                   </a:tcPr>
                 </a:tc>
@@ -4791,9 +4783,7 @@
                   </a:txBody>
                   <a:tcPr>
                     <a:solidFill>
-                      <a:schemeClr val="accent1">
-                        <a:lumMod val="50000"/>
-                      </a:schemeClr>
+                      <a:schemeClr val="accent2"/>
                     </a:solidFill>
                   </a:tcPr>
                 </a:tc>
@@ -4818,9 +4808,7 @@
                   </a:txBody>
                   <a:tcPr>
                     <a:solidFill>
-                      <a:schemeClr val="accent1">
-                        <a:lumMod val="50000"/>
-                      </a:schemeClr>
+                      <a:schemeClr val="accent2"/>
                     </a:solidFill>
                   </a:tcPr>
                 </a:tc>
@@ -4845,9 +4833,7 @@
                   </a:txBody>
                   <a:tcPr>
                     <a:solidFill>
-                      <a:schemeClr val="accent1">
-                        <a:lumMod val="50000"/>
-                      </a:schemeClr>
+                      <a:schemeClr val="accent2"/>
                     </a:solidFill>
                   </a:tcPr>
                 </a:tc>
@@ -4894,9 +4880,7 @@
                   </a:txBody>
                   <a:tcPr>
                     <a:solidFill>
-                      <a:schemeClr val="accent1">
-                        <a:lumMod val="50000"/>
-                      </a:schemeClr>
+                      <a:schemeClr val="accent2"/>
                     </a:solidFill>
                   </a:tcPr>
                 </a:tc>
@@ -4921,9 +4905,7 @@
                   </a:txBody>
                   <a:tcPr>
                     <a:solidFill>
-                      <a:schemeClr val="accent1">
-                        <a:lumMod val="50000"/>
-                      </a:schemeClr>
+                      <a:schemeClr val="accent2"/>
                     </a:solidFill>
                   </a:tcPr>
                 </a:tc>

</xml_diff>